<commit_message>
Carra adding the latest class book examples and the lecture for her presentation
</commit_message>
<xml_diff>
--- a/Lectures/Becoming_a_Modeler.pptx
+++ b/Lectures/Becoming_a_Modeler.pptx
@@ -11,6 +11,14 @@
     <p:sldId id="259" r:id="rId5"/>
     <p:sldId id="260" r:id="rId6"/>
     <p:sldId id="261" r:id="rId7"/>
+    <p:sldId id="262" r:id="rId8"/>
+    <p:sldId id="263" r:id="rId9"/>
+    <p:sldId id="264" r:id="rId10"/>
+    <p:sldId id="265" r:id="rId11"/>
+    <p:sldId id="266" r:id="rId12"/>
+    <p:sldId id="267" r:id="rId13"/>
+    <p:sldId id="268" r:id="rId14"/>
+    <p:sldId id="269" r:id="rId15"/>
   </p:sldIdLst>
   <p:sldSz cx="12192000" cy="6858000"/>
   <p:notesSz cx="6858000" cy="9144000"/>
@@ -343,7 +351,7 @@
           <a:p>
             <a:fld id="{2240EEA6-5825-4E93-954A-923BA4EF9BA5}" type="datetimeFigureOut">
               <a:rPr lang="en-US" smtClean="0"/>
-              <a:t>8/25/2022</a:t>
+              <a:t>8/30/2022</a:t>
             </a:fld>
             <a:endParaRPr lang="en-US"/>
           </a:p>
@@ -551,7 +559,7 @@
           <a:p>
             <a:fld id="{2240EEA6-5825-4E93-954A-923BA4EF9BA5}" type="datetimeFigureOut">
               <a:rPr lang="en-US" smtClean="0"/>
-              <a:t>8/25/2022</a:t>
+              <a:t>8/30/2022</a:t>
             </a:fld>
             <a:endParaRPr lang="en-US"/>
           </a:p>
@@ -807,7 +815,7 @@
           <a:p>
             <a:fld id="{2240EEA6-5825-4E93-954A-923BA4EF9BA5}" type="datetimeFigureOut">
               <a:rPr lang="en-US" smtClean="0"/>
-              <a:t>8/25/2022</a:t>
+              <a:t>8/30/2022</a:t>
             </a:fld>
             <a:endParaRPr lang="en-US"/>
           </a:p>
@@ -981,7 +989,7 @@
           <a:p>
             <a:fld id="{2240EEA6-5825-4E93-954A-923BA4EF9BA5}" type="datetimeFigureOut">
               <a:rPr lang="en-US" smtClean="0"/>
-              <a:t>8/25/2022</a:t>
+              <a:t>8/30/2022</a:t>
             </a:fld>
             <a:endParaRPr lang="en-US"/>
           </a:p>
@@ -1324,7 +1332,7 @@
           <a:p>
             <a:fld id="{2240EEA6-5825-4E93-954A-923BA4EF9BA5}" type="datetimeFigureOut">
               <a:rPr lang="en-US" smtClean="0"/>
-              <a:t>8/25/2022</a:t>
+              <a:t>8/30/2022</a:t>
             </a:fld>
             <a:endParaRPr lang="en-US"/>
           </a:p>
@@ -1599,7 +1607,7 @@
           <a:p>
             <a:fld id="{2240EEA6-5825-4E93-954A-923BA4EF9BA5}" type="datetimeFigureOut">
               <a:rPr lang="en-US" smtClean="0"/>
-              <a:t>8/25/2022</a:t>
+              <a:t>8/30/2022</a:t>
             </a:fld>
             <a:endParaRPr lang="en-US"/>
           </a:p>
@@ -1978,7 +1986,7 @@
           <a:p>
             <a:fld id="{2240EEA6-5825-4E93-954A-923BA4EF9BA5}" type="datetimeFigureOut">
               <a:rPr lang="en-US" smtClean="0"/>
-              <a:t>8/25/2022</a:t>
+              <a:t>8/30/2022</a:t>
             </a:fld>
             <a:endParaRPr lang="en-US"/>
           </a:p>
@@ -2096,7 +2104,7 @@
           <a:p>
             <a:fld id="{2240EEA6-5825-4E93-954A-923BA4EF9BA5}" type="datetimeFigureOut">
               <a:rPr lang="en-US" smtClean="0"/>
-              <a:t>8/25/2022</a:t>
+              <a:t>8/30/2022</a:t>
             </a:fld>
             <a:endParaRPr lang="en-US"/>
           </a:p>
@@ -2267,7 +2275,7 @@
           <a:p>
             <a:fld id="{2240EEA6-5825-4E93-954A-923BA4EF9BA5}" type="datetimeFigureOut">
               <a:rPr lang="en-US" smtClean="0"/>
-              <a:t>8/25/2022</a:t>
+              <a:t>8/30/2022</a:t>
             </a:fld>
             <a:endParaRPr lang="en-US"/>
           </a:p>
@@ -2621,7 +2629,7 @@
           <a:p>
             <a:fld id="{2240EEA6-5825-4E93-954A-923BA4EF9BA5}" type="datetimeFigureOut">
               <a:rPr lang="en-US" smtClean="0"/>
-              <a:t>8/25/2022</a:t>
+              <a:t>8/30/2022</a:t>
             </a:fld>
             <a:endParaRPr lang="en-US"/>
           </a:p>
@@ -3003,7 +3011,7 @@
           <a:p>
             <a:fld id="{2240EEA6-5825-4E93-954A-923BA4EF9BA5}" type="datetimeFigureOut">
               <a:rPr lang="en-US" smtClean="0"/>
-              <a:t>8/25/2022</a:t>
+              <a:t>8/30/2022</a:t>
             </a:fld>
             <a:endParaRPr lang="en-US"/>
           </a:p>
@@ -3290,7 +3298,7 @@
           <a:p>
             <a:fld id="{2240EEA6-5825-4E93-954A-923BA4EF9BA5}" type="datetimeFigureOut">
               <a:rPr lang="en-US" smtClean="0"/>
-              <a:t>8/25/2022</a:t>
+              <a:t>8/30/2022</a:t>
             </a:fld>
             <a:endParaRPr lang="en-US"/>
           </a:p>
@@ -4079,6 +4087,795 @@
 </p:sld>
 </file>
 
+<file path=ppt/slides/slide10.xml><?xml version="1.0" encoding="utf-8"?>
+<p:sld xmlns:a="http://schemas.openxmlformats.org/drawingml/2006/main" xmlns:r="http://schemas.openxmlformats.org/officeDocument/2006/relationships" xmlns:p="http://schemas.openxmlformats.org/presentationml/2006/main">
+  <p:cSld>
+    <p:spTree>
+      <p:nvGrpSpPr>
+        <p:cNvPr id="1" name=""/>
+        <p:cNvGrpSpPr/>
+        <p:nvPr/>
+      </p:nvGrpSpPr>
+      <p:grpSpPr>
+        <a:xfrm>
+          <a:off x="0" y="0"/>
+          <a:ext cx="0" cy="0"/>
+          <a:chOff x="0" y="0"/>
+          <a:chExt cx="0" cy="0"/>
+        </a:xfrm>
+      </p:grpSpPr>
+      <p:sp>
+        <p:nvSpPr>
+          <p:cNvPr id="2" name="Title 1">
+            <a:extLst>
+              <a:ext uri="{FF2B5EF4-FFF2-40B4-BE49-F238E27FC236}">
+                <a16:creationId xmlns:a16="http://schemas.microsoft.com/office/drawing/2014/main" id="{091D69AC-2A36-4D91-B9DF-89140504316F}"/>
+              </a:ext>
+            </a:extLst>
+          </p:cNvPr>
+          <p:cNvSpPr>
+            <a:spLocks noGrp="1"/>
+          </p:cNvSpPr>
+          <p:nvPr>
+            <p:ph type="title"/>
+          </p:nvPr>
+        </p:nvSpPr>
+        <p:spPr>
+          <a:xfrm>
+            <a:off x="1097280" y="0"/>
+            <a:ext cx="10058400" cy="772357"/>
+          </a:xfrm>
+        </p:spPr>
+        <p:txBody>
+          <a:bodyPr/>
+          <a:lstStyle/>
+          <a:p>
+            <a:r>
+              <a:rPr lang="en-US" dirty="0"/>
+              <a:t>Modeling Difficulty	</a:t>
+            </a:r>
+          </a:p>
+        </p:txBody>
+      </p:sp>
+      <p:sp>
+        <p:nvSpPr>
+          <p:cNvPr id="3" name="Content Placeholder 2">
+            <a:extLst>
+              <a:ext uri="{FF2B5EF4-FFF2-40B4-BE49-F238E27FC236}">
+                <a16:creationId xmlns:a16="http://schemas.microsoft.com/office/drawing/2014/main" id="{9AB2A4B9-2C68-45ED-9EA0-A1A645594C7F}"/>
+              </a:ext>
+            </a:extLst>
+          </p:cNvPr>
+          <p:cNvSpPr>
+            <a:spLocks noGrp="1"/>
+          </p:cNvSpPr>
+          <p:nvPr>
+            <p:ph idx="1"/>
+          </p:nvPr>
+        </p:nvSpPr>
+        <p:spPr>
+          <a:xfrm>
+            <a:off x="1097280" y="1269505"/>
+            <a:ext cx="10372670" cy="3969273"/>
+          </a:xfrm>
+        </p:spPr>
+        <p:txBody>
+          <a:bodyPr>
+            <a:normAutofit/>
+          </a:bodyPr>
+          <a:lstStyle/>
+          <a:p>
+            <a:pPr>
+              <a:buFont typeface="Arial" panose="020B0604020202020204" pitchFamily="34" charset="0"/>
+              <a:buChar char="•"/>
+            </a:pPr>
+            <a:r>
+              <a:rPr lang="en-US" sz="2800" dirty="0"/>
+              <a:t>Save……….ALOT!!!!</a:t>
+            </a:r>
+          </a:p>
+          <a:p>
+            <a:pPr>
+              <a:buFont typeface="Arial" panose="020B0604020202020204" pitchFamily="34" charset="0"/>
+              <a:buChar char="•"/>
+            </a:pPr>
+            <a:endParaRPr lang="en-US" sz="2800" dirty="0"/>
+          </a:p>
+          <a:p>
+            <a:pPr>
+              <a:buFont typeface="Arial" panose="020B0604020202020204" pitchFamily="34" charset="0"/>
+              <a:buChar char="•"/>
+            </a:pPr>
+            <a:r>
+              <a:rPr lang="en-US" sz="2800" dirty="0"/>
+              <a:t>After each chunk of code</a:t>
+            </a:r>
+          </a:p>
+          <a:p>
+            <a:pPr>
+              <a:buFont typeface="Arial" panose="020B0604020202020204" pitchFamily="34" charset="0"/>
+              <a:buChar char="•"/>
+            </a:pPr>
+            <a:r>
+              <a:rPr lang="en-US" sz="2800" dirty="0"/>
+              <a:t>Set computer to autosave </a:t>
+            </a:r>
+          </a:p>
+          <a:p>
+            <a:pPr>
+              <a:buFont typeface="Arial" panose="020B0604020202020204" pitchFamily="34" charset="0"/>
+              <a:buChar char="•"/>
+            </a:pPr>
+            <a:r>
+              <a:rPr lang="en-US" sz="2800" dirty="0"/>
+              <a:t>Won’t lose as much data if computer reboots</a:t>
+            </a:r>
+          </a:p>
+          <a:p>
+            <a:pPr marL="0" indent="0">
+              <a:buNone/>
+            </a:pPr>
+            <a:endParaRPr lang="en-US" dirty="0"/>
+          </a:p>
+          <a:p>
+            <a:pPr>
+              <a:buFont typeface="Arial" panose="020B0604020202020204" pitchFamily="34" charset="0"/>
+              <a:buChar char="•"/>
+            </a:pPr>
+            <a:endParaRPr lang="en-US" dirty="0"/>
+          </a:p>
+        </p:txBody>
+      </p:sp>
+      <p:pic>
+        <p:nvPicPr>
+          <p:cNvPr id="5" name="Picture 4">
+            <a:extLst>
+              <a:ext uri="{FF2B5EF4-FFF2-40B4-BE49-F238E27FC236}">
+                <a16:creationId xmlns:a16="http://schemas.microsoft.com/office/drawing/2014/main" id="{CAE614F1-46C4-4DE0-8EA7-D45B3DD068F7}"/>
+              </a:ext>
+            </a:extLst>
+          </p:cNvPr>
+          <p:cNvPicPr>
+            <a:picLocks noChangeAspect="1"/>
+          </p:cNvPicPr>
+          <p:nvPr/>
+        </p:nvPicPr>
+        <p:blipFill>
+          <a:blip r:embed="rId2"/>
+          <a:stretch>
+            <a:fillRect/>
+          </a:stretch>
+        </p:blipFill>
+        <p:spPr>
+          <a:xfrm>
+            <a:off x="8424677" y="2182578"/>
+            <a:ext cx="3405917" cy="3405917"/>
+          </a:xfrm>
+          <a:prstGeom prst="rect">
+            <a:avLst/>
+          </a:prstGeom>
+        </p:spPr>
+      </p:pic>
+    </p:spTree>
+    <p:extLst>
+      <p:ext uri="{BB962C8B-B14F-4D97-AF65-F5344CB8AC3E}">
+        <p14:creationId xmlns:p14="http://schemas.microsoft.com/office/powerpoint/2010/main" val="2912313532"/>
+      </p:ext>
+    </p:extLst>
+  </p:cSld>
+  <p:clrMapOvr>
+    <a:masterClrMapping/>
+  </p:clrMapOvr>
+</p:sld>
+</file>
+
+<file path=ppt/slides/slide11.xml><?xml version="1.0" encoding="utf-8"?>
+<p:sld xmlns:a="http://schemas.openxmlformats.org/drawingml/2006/main" xmlns:r="http://schemas.openxmlformats.org/officeDocument/2006/relationships" xmlns:p="http://schemas.openxmlformats.org/presentationml/2006/main">
+  <p:cSld>
+    <p:spTree>
+      <p:nvGrpSpPr>
+        <p:cNvPr id="1" name=""/>
+        <p:cNvGrpSpPr/>
+        <p:nvPr/>
+      </p:nvGrpSpPr>
+      <p:grpSpPr>
+        <a:xfrm>
+          <a:off x="0" y="0"/>
+          <a:ext cx="0" cy="0"/>
+          <a:chOff x="0" y="0"/>
+          <a:chExt cx="0" cy="0"/>
+        </a:xfrm>
+      </p:grpSpPr>
+      <p:sp>
+        <p:nvSpPr>
+          <p:cNvPr id="2" name="Title 1">
+            <a:extLst>
+              <a:ext uri="{FF2B5EF4-FFF2-40B4-BE49-F238E27FC236}">
+                <a16:creationId xmlns:a16="http://schemas.microsoft.com/office/drawing/2014/main" id="{091D69AC-2A36-4D91-B9DF-89140504316F}"/>
+              </a:ext>
+            </a:extLst>
+          </p:cNvPr>
+          <p:cNvSpPr>
+            <a:spLocks noGrp="1"/>
+          </p:cNvSpPr>
+          <p:nvPr>
+            <p:ph type="title"/>
+          </p:nvPr>
+        </p:nvSpPr>
+        <p:spPr>
+          <a:xfrm>
+            <a:off x="1097280" y="0"/>
+            <a:ext cx="10058400" cy="772357"/>
+          </a:xfrm>
+        </p:spPr>
+        <p:txBody>
+          <a:bodyPr/>
+          <a:lstStyle/>
+          <a:p>
+            <a:r>
+              <a:rPr lang="en-US" dirty="0"/>
+              <a:t>Modeling Difficulty	</a:t>
+            </a:r>
+          </a:p>
+        </p:txBody>
+      </p:sp>
+      <p:sp>
+        <p:nvSpPr>
+          <p:cNvPr id="3" name="Content Placeholder 2">
+            <a:extLst>
+              <a:ext uri="{FF2B5EF4-FFF2-40B4-BE49-F238E27FC236}">
+                <a16:creationId xmlns:a16="http://schemas.microsoft.com/office/drawing/2014/main" id="{9AB2A4B9-2C68-45ED-9EA0-A1A645594C7F}"/>
+              </a:ext>
+            </a:extLst>
+          </p:cNvPr>
+          <p:cNvSpPr>
+            <a:spLocks noGrp="1"/>
+          </p:cNvSpPr>
+          <p:nvPr>
+            <p:ph idx="1"/>
+          </p:nvPr>
+        </p:nvSpPr>
+        <p:spPr>
+          <a:xfrm>
+            <a:off x="1097280" y="1269505"/>
+            <a:ext cx="10372670" cy="3969273"/>
+          </a:xfrm>
+        </p:spPr>
+        <p:txBody>
+          <a:bodyPr>
+            <a:normAutofit/>
+          </a:bodyPr>
+          <a:lstStyle/>
+          <a:p>
+            <a:pPr>
+              <a:buFont typeface="Arial" panose="020B0604020202020204" pitchFamily="34" charset="0"/>
+              <a:buChar char="•"/>
+            </a:pPr>
+            <a:r>
+              <a:rPr lang="en-US" sz="2800" dirty="0"/>
+              <a:t>Make thorough comments throughout code</a:t>
+            </a:r>
+          </a:p>
+          <a:p>
+            <a:pPr>
+              <a:buFont typeface="Arial" panose="020B0604020202020204" pitchFamily="34" charset="0"/>
+              <a:buChar char="•"/>
+            </a:pPr>
+            <a:endParaRPr lang="en-US" sz="2800" dirty="0"/>
+          </a:p>
+          <a:p>
+            <a:pPr>
+              <a:buFont typeface="Arial" panose="020B0604020202020204" pitchFamily="34" charset="0"/>
+              <a:buChar char="•"/>
+            </a:pPr>
+            <a:r>
+              <a:rPr lang="en-US" sz="2800" dirty="0"/>
+              <a:t>Helps you remember what the code is doing</a:t>
+            </a:r>
+          </a:p>
+          <a:p>
+            <a:pPr>
+              <a:buFont typeface="Arial" panose="020B0604020202020204" pitchFamily="34" charset="0"/>
+              <a:buChar char="•"/>
+            </a:pPr>
+            <a:r>
+              <a:rPr lang="en-US" sz="2800" dirty="0"/>
+              <a:t>Help others know what you are wanting to do</a:t>
+            </a:r>
+          </a:p>
+          <a:p>
+            <a:pPr>
+              <a:buFont typeface="Arial" panose="020B0604020202020204" pitchFamily="34" charset="0"/>
+              <a:buChar char="•"/>
+            </a:pPr>
+            <a:endParaRPr lang="en-US" sz="2800" dirty="0"/>
+          </a:p>
+          <a:p>
+            <a:pPr marL="0" indent="0">
+              <a:buNone/>
+            </a:pPr>
+            <a:endParaRPr lang="en-US" dirty="0"/>
+          </a:p>
+          <a:p>
+            <a:pPr>
+              <a:buFont typeface="Arial" panose="020B0604020202020204" pitchFamily="34" charset="0"/>
+              <a:buChar char="•"/>
+            </a:pPr>
+            <a:endParaRPr lang="en-US" dirty="0"/>
+          </a:p>
+        </p:txBody>
+      </p:sp>
+      <p:pic>
+        <p:nvPicPr>
+          <p:cNvPr id="6" name="Picture 5">
+            <a:extLst>
+              <a:ext uri="{FF2B5EF4-FFF2-40B4-BE49-F238E27FC236}">
+                <a16:creationId xmlns:a16="http://schemas.microsoft.com/office/drawing/2014/main" id="{E533528B-5735-4A99-972B-CAC4482E76E1}"/>
+              </a:ext>
+            </a:extLst>
+          </p:cNvPr>
+          <p:cNvPicPr>
+            <a:picLocks noChangeAspect="1"/>
+          </p:cNvPicPr>
+          <p:nvPr/>
+        </p:nvPicPr>
+        <p:blipFill rotWithShape="1">
+          <a:blip r:embed="rId2"/>
+          <a:srcRect l="10000" t="31667" r="25625" b="38750"/>
+          <a:stretch/>
+        </p:blipFill>
+        <p:spPr>
+          <a:xfrm>
+            <a:off x="1800225" y="3707101"/>
+            <a:ext cx="7848600" cy="2028825"/>
+          </a:xfrm>
+          <a:prstGeom prst="rect">
+            <a:avLst/>
+          </a:prstGeom>
+        </p:spPr>
+      </p:pic>
+    </p:spTree>
+    <p:extLst>
+      <p:ext uri="{BB962C8B-B14F-4D97-AF65-F5344CB8AC3E}">
+        <p14:creationId xmlns:p14="http://schemas.microsoft.com/office/powerpoint/2010/main" val="3603924653"/>
+      </p:ext>
+    </p:extLst>
+  </p:cSld>
+  <p:clrMapOvr>
+    <a:masterClrMapping/>
+  </p:clrMapOvr>
+</p:sld>
+</file>
+
+<file path=ppt/slides/slide12.xml><?xml version="1.0" encoding="utf-8"?>
+<p:sld xmlns:a="http://schemas.openxmlformats.org/drawingml/2006/main" xmlns:r="http://schemas.openxmlformats.org/officeDocument/2006/relationships" xmlns:p="http://schemas.openxmlformats.org/presentationml/2006/main">
+  <p:cSld>
+    <p:spTree>
+      <p:nvGrpSpPr>
+        <p:cNvPr id="1" name=""/>
+        <p:cNvGrpSpPr/>
+        <p:nvPr/>
+      </p:nvGrpSpPr>
+      <p:grpSpPr>
+        <a:xfrm>
+          <a:off x="0" y="0"/>
+          <a:ext cx="0" cy="0"/>
+          <a:chOff x="0" y="0"/>
+          <a:chExt cx="0" cy="0"/>
+        </a:xfrm>
+      </p:grpSpPr>
+      <p:sp>
+        <p:nvSpPr>
+          <p:cNvPr id="2" name="Title 1">
+            <a:extLst>
+              <a:ext uri="{FF2B5EF4-FFF2-40B4-BE49-F238E27FC236}">
+                <a16:creationId xmlns:a16="http://schemas.microsoft.com/office/drawing/2014/main" id="{091D69AC-2A36-4D91-B9DF-89140504316F}"/>
+              </a:ext>
+            </a:extLst>
+          </p:cNvPr>
+          <p:cNvSpPr>
+            <a:spLocks noGrp="1"/>
+          </p:cNvSpPr>
+          <p:nvPr>
+            <p:ph type="title"/>
+          </p:nvPr>
+        </p:nvSpPr>
+        <p:spPr>
+          <a:xfrm>
+            <a:off x="1097280" y="0"/>
+            <a:ext cx="10058400" cy="772357"/>
+          </a:xfrm>
+        </p:spPr>
+        <p:txBody>
+          <a:bodyPr/>
+          <a:lstStyle/>
+          <a:p>
+            <a:r>
+              <a:rPr lang="en-US" dirty="0"/>
+              <a:t>Modeling Difficulty	</a:t>
+            </a:r>
+          </a:p>
+        </p:txBody>
+      </p:sp>
+      <p:sp>
+        <p:nvSpPr>
+          <p:cNvPr id="3" name="Content Placeholder 2">
+            <a:extLst>
+              <a:ext uri="{FF2B5EF4-FFF2-40B4-BE49-F238E27FC236}">
+                <a16:creationId xmlns:a16="http://schemas.microsoft.com/office/drawing/2014/main" id="{9AB2A4B9-2C68-45ED-9EA0-A1A645594C7F}"/>
+              </a:ext>
+            </a:extLst>
+          </p:cNvPr>
+          <p:cNvSpPr>
+            <a:spLocks noGrp="1"/>
+          </p:cNvSpPr>
+          <p:nvPr>
+            <p:ph idx="1"/>
+          </p:nvPr>
+        </p:nvSpPr>
+        <p:spPr>
+          <a:xfrm>
+            <a:off x="1097280" y="1269505"/>
+            <a:ext cx="10372670" cy="3969273"/>
+          </a:xfrm>
+        </p:spPr>
+        <p:txBody>
+          <a:bodyPr>
+            <a:normAutofit/>
+          </a:bodyPr>
+          <a:lstStyle/>
+          <a:p>
+            <a:pPr>
+              <a:buFont typeface="Arial" panose="020B0604020202020204" pitchFamily="34" charset="0"/>
+              <a:buChar char="•"/>
+            </a:pPr>
+            <a:r>
+              <a:rPr lang="en-US" sz="2800" dirty="0"/>
+              <a:t>Explaining out loud</a:t>
+            </a:r>
+          </a:p>
+          <a:p>
+            <a:pPr>
+              <a:buFont typeface="Arial" panose="020B0604020202020204" pitchFamily="34" charset="0"/>
+              <a:buChar char="•"/>
+            </a:pPr>
+            <a:endParaRPr lang="en-US" sz="2800" dirty="0"/>
+          </a:p>
+          <a:p>
+            <a:pPr>
+              <a:buFont typeface="Arial" panose="020B0604020202020204" pitchFamily="34" charset="0"/>
+              <a:buChar char="•"/>
+            </a:pPr>
+            <a:r>
+              <a:rPr lang="en-US" sz="2800" dirty="0"/>
+              <a:t>Verbally explaining the conceptual model can help find errors</a:t>
+            </a:r>
+          </a:p>
+          <a:p>
+            <a:pPr>
+              <a:buFont typeface="Arial" panose="020B0604020202020204" pitchFamily="34" charset="0"/>
+              <a:buChar char="•"/>
+            </a:pPr>
+            <a:r>
+              <a:rPr lang="en-US" sz="2800" dirty="0"/>
+              <a:t>Fresh eyes and ears can ask questions/make suggestions</a:t>
+            </a:r>
+          </a:p>
+          <a:p>
+            <a:pPr>
+              <a:buFont typeface="Arial" panose="020B0604020202020204" pitchFamily="34" charset="0"/>
+              <a:buChar char="•"/>
+            </a:pPr>
+            <a:endParaRPr lang="en-US" sz="2800" dirty="0"/>
+          </a:p>
+          <a:p>
+            <a:pPr marL="0" indent="0">
+              <a:buNone/>
+            </a:pPr>
+            <a:endParaRPr lang="en-US" dirty="0"/>
+          </a:p>
+          <a:p>
+            <a:pPr>
+              <a:buFont typeface="Arial" panose="020B0604020202020204" pitchFamily="34" charset="0"/>
+              <a:buChar char="•"/>
+            </a:pPr>
+            <a:endParaRPr lang="en-US" dirty="0"/>
+          </a:p>
+        </p:txBody>
+      </p:sp>
+    </p:spTree>
+    <p:extLst>
+      <p:ext uri="{BB962C8B-B14F-4D97-AF65-F5344CB8AC3E}">
+        <p14:creationId xmlns:p14="http://schemas.microsoft.com/office/powerpoint/2010/main" val="2686229171"/>
+      </p:ext>
+    </p:extLst>
+  </p:cSld>
+  <p:clrMapOvr>
+    <a:masterClrMapping/>
+  </p:clrMapOvr>
+</p:sld>
+</file>
+
+<file path=ppt/slides/slide13.xml><?xml version="1.0" encoding="utf-8"?>
+<p:sld xmlns:a="http://schemas.openxmlformats.org/drawingml/2006/main" xmlns:r="http://schemas.openxmlformats.org/officeDocument/2006/relationships" xmlns:p="http://schemas.openxmlformats.org/presentationml/2006/main">
+  <p:cSld>
+    <p:spTree>
+      <p:nvGrpSpPr>
+        <p:cNvPr id="1" name=""/>
+        <p:cNvGrpSpPr/>
+        <p:nvPr/>
+      </p:nvGrpSpPr>
+      <p:grpSpPr>
+        <a:xfrm>
+          <a:off x="0" y="0"/>
+          <a:ext cx="0" cy="0"/>
+          <a:chOff x="0" y="0"/>
+          <a:chExt cx="0" cy="0"/>
+        </a:xfrm>
+      </p:grpSpPr>
+      <p:sp>
+        <p:nvSpPr>
+          <p:cNvPr id="2" name="Title 1">
+            <a:extLst>
+              <a:ext uri="{FF2B5EF4-FFF2-40B4-BE49-F238E27FC236}">
+                <a16:creationId xmlns:a16="http://schemas.microsoft.com/office/drawing/2014/main" id="{091D69AC-2A36-4D91-B9DF-89140504316F}"/>
+              </a:ext>
+            </a:extLst>
+          </p:cNvPr>
+          <p:cNvSpPr>
+            <a:spLocks noGrp="1"/>
+          </p:cNvSpPr>
+          <p:nvPr>
+            <p:ph type="title"/>
+          </p:nvPr>
+        </p:nvSpPr>
+        <p:spPr>
+          <a:xfrm>
+            <a:off x="1008503" y="1074198"/>
+            <a:ext cx="10058400" cy="772357"/>
+          </a:xfrm>
+        </p:spPr>
+        <p:txBody>
+          <a:bodyPr/>
+          <a:lstStyle/>
+          <a:p>
+            <a:r>
+              <a:rPr lang="en-US" dirty="0"/>
+              <a:t>Conclusion</a:t>
+            </a:r>
+          </a:p>
+        </p:txBody>
+      </p:sp>
+      <p:sp>
+        <p:nvSpPr>
+          <p:cNvPr id="3" name="Content Placeholder 2">
+            <a:extLst>
+              <a:ext uri="{FF2B5EF4-FFF2-40B4-BE49-F238E27FC236}">
+                <a16:creationId xmlns:a16="http://schemas.microsoft.com/office/drawing/2014/main" id="{9AB2A4B9-2C68-45ED-9EA0-A1A645594C7F}"/>
+              </a:ext>
+            </a:extLst>
+          </p:cNvPr>
+          <p:cNvSpPr>
+            <a:spLocks noGrp="1"/>
+          </p:cNvSpPr>
+          <p:nvPr>
+            <p:ph idx="1"/>
+          </p:nvPr>
+        </p:nvSpPr>
+        <p:spPr>
+          <a:xfrm>
+            <a:off x="1008503" y="1917575"/>
+            <a:ext cx="10372670" cy="3969273"/>
+          </a:xfrm>
+        </p:spPr>
+        <p:txBody>
+          <a:bodyPr>
+            <a:normAutofit/>
+          </a:bodyPr>
+          <a:lstStyle/>
+          <a:p>
+            <a:pPr>
+              <a:buFont typeface="Arial" panose="020B0604020202020204" pitchFamily="34" charset="0"/>
+              <a:buChar char="•"/>
+            </a:pPr>
+            <a:r>
+              <a:rPr lang="en-US" sz="2800" dirty="0"/>
+              <a:t>Modeling takes practice</a:t>
+            </a:r>
+          </a:p>
+          <a:p>
+            <a:pPr lvl="1">
+              <a:buFont typeface="Arial" panose="020B0604020202020204" pitchFamily="34" charset="0"/>
+              <a:buChar char="•"/>
+            </a:pPr>
+            <a:r>
+              <a:rPr lang="en-US" sz="2600" dirty="0"/>
+              <a:t>Need to work on it many times before fully comfortable</a:t>
+            </a:r>
+          </a:p>
+          <a:p>
+            <a:pPr>
+              <a:buFont typeface="Arial" panose="020B0604020202020204" pitchFamily="34" charset="0"/>
+              <a:buChar char="•"/>
+            </a:pPr>
+            <a:r>
+              <a:rPr lang="en-US" sz="2800" dirty="0"/>
+              <a:t>A new language</a:t>
+            </a:r>
+          </a:p>
+          <a:p>
+            <a:pPr>
+              <a:buFont typeface="Arial" panose="020B0604020202020204" pitchFamily="34" charset="0"/>
+              <a:buChar char="•"/>
+            </a:pPr>
+            <a:r>
+              <a:rPr lang="en-US" sz="2800" dirty="0"/>
+              <a:t>It’s ok to get frustrated, that comes with the territory</a:t>
+            </a:r>
+          </a:p>
+          <a:p>
+            <a:pPr marL="0" indent="0">
+              <a:buNone/>
+            </a:pPr>
+            <a:endParaRPr lang="en-US" dirty="0"/>
+          </a:p>
+          <a:p>
+            <a:pPr>
+              <a:buFont typeface="Arial" panose="020B0604020202020204" pitchFamily="34" charset="0"/>
+              <a:buChar char="•"/>
+            </a:pPr>
+            <a:endParaRPr lang="en-US" dirty="0"/>
+          </a:p>
+        </p:txBody>
+      </p:sp>
+    </p:spTree>
+    <p:extLst>
+      <p:ext uri="{BB962C8B-B14F-4D97-AF65-F5344CB8AC3E}">
+        <p14:creationId xmlns:p14="http://schemas.microsoft.com/office/powerpoint/2010/main" val="1769710535"/>
+      </p:ext>
+    </p:extLst>
+  </p:cSld>
+  <p:clrMapOvr>
+    <a:masterClrMapping/>
+  </p:clrMapOvr>
+</p:sld>
+</file>
+
+<file path=ppt/slides/slide14.xml><?xml version="1.0" encoding="utf-8"?>
+<p:sld xmlns:a="http://schemas.openxmlformats.org/drawingml/2006/main" xmlns:r="http://schemas.openxmlformats.org/officeDocument/2006/relationships" xmlns:p="http://schemas.openxmlformats.org/presentationml/2006/main">
+  <p:cSld>
+    <p:spTree>
+      <p:nvGrpSpPr>
+        <p:cNvPr id="1" name=""/>
+        <p:cNvGrpSpPr/>
+        <p:nvPr/>
+      </p:nvGrpSpPr>
+      <p:grpSpPr>
+        <a:xfrm>
+          <a:off x="0" y="0"/>
+          <a:ext cx="0" cy="0"/>
+          <a:chOff x="0" y="0"/>
+          <a:chExt cx="0" cy="0"/>
+        </a:xfrm>
+      </p:grpSpPr>
+      <p:sp>
+        <p:nvSpPr>
+          <p:cNvPr id="2" name="Title 1">
+            <a:extLst>
+              <a:ext uri="{FF2B5EF4-FFF2-40B4-BE49-F238E27FC236}">
+                <a16:creationId xmlns:a16="http://schemas.microsoft.com/office/drawing/2014/main" id="{091D69AC-2A36-4D91-B9DF-89140504316F}"/>
+              </a:ext>
+            </a:extLst>
+          </p:cNvPr>
+          <p:cNvSpPr>
+            <a:spLocks noGrp="1"/>
+          </p:cNvSpPr>
+          <p:nvPr>
+            <p:ph type="title"/>
+          </p:nvPr>
+        </p:nvSpPr>
+        <p:spPr>
+          <a:xfrm>
+            <a:off x="1008503" y="1074198"/>
+            <a:ext cx="10058400" cy="772357"/>
+          </a:xfrm>
+        </p:spPr>
+        <p:txBody>
+          <a:bodyPr/>
+          <a:lstStyle/>
+          <a:p>
+            <a:r>
+              <a:rPr lang="en-US" dirty="0"/>
+              <a:t>Questions?</a:t>
+            </a:r>
+          </a:p>
+        </p:txBody>
+      </p:sp>
+      <p:sp>
+        <p:nvSpPr>
+          <p:cNvPr id="3" name="Content Placeholder 2">
+            <a:extLst>
+              <a:ext uri="{FF2B5EF4-FFF2-40B4-BE49-F238E27FC236}">
+                <a16:creationId xmlns:a16="http://schemas.microsoft.com/office/drawing/2014/main" id="{9AB2A4B9-2C68-45ED-9EA0-A1A645594C7F}"/>
+              </a:ext>
+            </a:extLst>
+          </p:cNvPr>
+          <p:cNvSpPr>
+            <a:spLocks noGrp="1"/>
+          </p:cNvSpPr>
+          <p:nvPr>
+            <p:ph idx="1"/>
+          </p:nvPr>
+        </p:nvSpPr>
+        <p:spPr>
+          <a:xfrm>
+            <a:off x="1008503" y="1917575"/>
+            <a:ext cx="10372670" cy="3969273"/>
+          </a:xfrm>
+        </p:spPr>
+        <p:txBody>
+          <a:bodyPr>
+            <a:normAutofit/>
+          </a:bodyPr>
+          <a:lstStyle/>
+          <a:p>
+            <a:pPr marL="0" indent="0">
+              <a:buNone/>
+            </a:pPr>
+            <a:endParaRPr lang="en-US" dirty="0"/>
+          </a:p>
+          <a:p>
+            <a:pPr>
+              <a:buFont typeface="Arial" panose="020B0604020202020204" pitchFamily="34" charset="0"/>
+              <a:buChar char="•"/>
+            </a:pPr>
+            <a:endParaRPr lang="en-US" dirty="0"/>
+          </a:p>
+        </p:txBody>
+      </p:sp>
+      <p:pic>
+        <p:nvPicPr>
+          <p:cNvPr id="4" name="Picture 3">
+            <a:extLst>
+              <a:ext uri="{FF2B5EF4-FFF2-40B4-BE49-F238E27FC236}">
+                <a16:creationId xmlns:a16="http://schemas.microsoft.com/office/drawing/2014/main" id="{54C2C87C-1E5E-4845-AA35-A2BF3B3D5B78}"/>
+              </a:ext>
+            </a:extLst>
+          </p:cNvPr>
+          <p:cNvPicPr>
+            <a:picLocks noChangeAspect="1"/>
+          </p:cNvPicPr>
+          <p:nvPr/>
+        </p:nvPicPr>
+        <p:blipFill>
+          <a:blip r:embed="rId2"/>
+          <a:stretch>
+            <a:fillRect/>
+          </a:stretch>
+        </p:blipFill>
+        <p:spPr>
+          <a:xfrm>
+            <a:off x="4071937" y="1917575"/>
+            <a:ext cx="3900487" cy="3900487"/>
+          </a:xfrm>
+          <a:prstGeom prst="rect">
+            <a:avLst/>
+          </a:prstGeom>
+        </p:spPr>
+      </p:pic>
+    </p:spTree>
+    <p:extLst>
+      <p:ext uri="{BB962C8B-B14F-4D97-AF65-F5344CB8AC3E}">
+        <p14:creationId xmlns:p14="http://schemas.microsoft.com/office/powerpoint/2010/main" val="326771483"/>
+      </p:ext>
+    </p:extLst>
+  </p:cSld>
+  <p:clrMapOvr>
+    <a:masterClrMapping/>
+  </p:clrMapOvr>
+</p:sld>
+</file>
+
 <file path=ppt/slides/slide2.xml><?xml version="1.0" encoding="utf-8"?>
 <p:sld xmlns:a="http://schemas.openxmlformats.org/drawingml/2006/main" xmlns:r="http://schemas.openxmlformats.org/officeDocument/2006/relationships" xmlns:p="http://schemas.openxmlformats.org/presentationml/2006/main">
   <p:cSld>
@@ -4661,16 +5458,6 @@
             </a:pPr>
             <a:r>
               <a:rPr lang="en-US" dirty="0"/>
-              <a:t>Computers are only as smart as the user</a:t>
-            </a:r>
-          </a:p>
-          <a:p>
-            <a:pPr>
-              <a:buFont typeface="Arial" panose="020B0604020202020204" pitchFamily="34" charset="0"/>
-              <a:buChar char="•"/>
-            </a:pPr>
-            <a:r>
-              <a:rPr lang="en-US" dirty="0"/>
               <a:t>K.I.S – Keep It Simple</a:t>
             </a:r>
           </a:p>
@@ -4786,7 +5573,12 @@
             <p:ph type="title"/>
           </p:nvPr>
         </p:nvSpPr>
-        <p:spPr/>
+        <p:spPr>
+          <a:xfrm>
+            <a:off x="1066800" y="0"/>
+            <a:ext cx="10058400" cy="769840"/>
+          </a:xfrm>
+        </p:spPr>
         <p:txBody>
           <a:bodyPr/>
           <a:lstStyle/>
@@ -4816,7 +5608,7 @@
         </p:nvSpPr>
         <p:spPr>
           <a:xfrm>
-            <a:off x="1097280" y="1845734"/>
+            <a:off x="1066800" y="1243810"/>
             <a:ext cx="10159605" cy="4023360"/>
           </a:xfrm>
         </p:spPr>
@@ -4832,7 +5624,57 @@
             </a:pPr>
             <a:r>
               <a:rPr lang="en-US" sz="2800" dirty="0"/>
-              <a:t>Computers are only as smart as the user</a:t>
+              <a:t>Keep It Simple</a:t>
+            </a:r>
+          </a:p>
+          <a:p>
+            <a:pPr lvl="1">
+              <a:buFont typeface="Arial" panose="020B0604020202020204" pitchFamily="34" charset="0"/>
+              <a:buChar char="•"/>
+            </a:pPr>
+            <a:r>
+              <a:rPr lang="en-US" sz="2600" dirty="0"/>
+              <a:t>When starting to code, it is better to have multiple small, simple steps </a:t>
+            </a:r>
+          </a:p>
+          <a:p>
+            <a:pPr lvl="1">
+              <a:buFont typeface="Arial" panose="020B0604020202020204" pitchFamily="34" charset="0"/>
+              <a:buChar char="•"/>
+            </a:pPr>
+            <a:r>
+              <a:rPr lang="en-US" sz="2600" dirty="0"/>
+              <a:t>Example: Quadratic Equation</a:t>
+            </a:r>
+          </a:p>
+          <a:p>
+            <a:pPr lvl="2" algn="ctr">
+              <a:buFont typeface="Arial" panose="020B0604020202020204" pitchFamily="34" charset="0"/>
+              <a:buChar char="•"/>
+            </a:pPr>
+            <a:r>
+              <a:rPr lang="en-US" sz="2200" dirty="0"/>
+              <a:t>A = 2</a:t>
+            </a:r>
+          </a:p>
+          <a:p>
+            <a:pPr lvl="2" algn="ctr">
+              <a:buFont typeface="Arial" panose="020B0604020202020204" pitchFamily="34" charset="0"/>
+              <a:buChar char="•"/>
+            </a:pPr>
+            <a:r>
+              <a:rPr lang="en-US" sz="2200" dirty="0"/>
+              <a:t>B = 4</a:t>
+            </a:r>
+          </a:p>
+          <a:p>
+            <a:pPr lvl="2" algn="ctr">
+              <a:buFont typeface="Arial" panose="020B0604020202020204" pitchFamily="34" charset="0"/>
+              <a:buChar char="•"/>
+            </a:pPr>
+            <a:r>
+              <a:rPr lang="en-US" sz="2200" dirty="0"/>
+              <a:t>C = 4.47</a:t>
             </a:r>
           </a:p>
           <a:p>
@@ -4851,10 +5693,692 @@
           </a:p>
         </p:txBody>
       </p:sp>
+      <p:pic>
+        <p:nvPicPr>
+          <p:cNvPr id="5" name="Picture 4">
+            <a:extLst>
+              <a:ext uri="{FF2B5EF4-FFF2-40B4-BE49-F238E27FC236}">
+                <a16:creationId xmlns:a16="http://schemas.microsoft.com/office/drawing/2014/main" id="{FBA8EEBB-56E8-492B-B0BE-CF82411162C6}"/>
+              </a:ext>
+            </a:extLst>
+          </p:cNvPr>
+          <p:cNvPicPr>
+            <a:picLocks noChangeAspect="1"/>
+          </p:cNvPicPr>
+          <p:nvPr/>
+        </p:nvPicPr>
+        <p:blipFill rotWithShape="1">
+          <a:blip r:embed="rId2"/>
+          <a:srcRect l="23515" t="29584" r="62110" b="42916"/>
+          <a:stretch/>
+        </p:blipFill>
+        <p:spPr>
+          <a:xfrm>
+            <a:off x="1314450" y="3707945"/>
+            <a:ext cx="2334272" cy="2511880"/>
+          </a:xfrm>
+          <a:prstGeom prst="rect">
+            <a:avLst/>
+          </a:prstGeom>
+        </p:spPr>
+      </p:pic>
+      <p:pic>
+        <p:nvPicPr>
+          <p:cNvPr id="7" name="Picture 6">
+            <a:extLst>
+              <a:ext uri="{FF2B5EF4-FFF2-40B4-BE49-F238E27FC236}">
+                <a16:creationId xmlns:a16="http://schemas.microsoft.com/office/drawing/2014/main" id="{4196E6F3-4F9B-40BF-8B31-2843870A267A}"/>
+              </a:ext>
+            </a:extLst>
+          </p:cNvPr>
+          <p:cNvPicPr>
+            <a:picLocks noChangeAspect="1"/>
+          </p:cNvPicPr>
+          <p:nvPr/>
+        </p:nvPicPr>
+        <p:blipFill rotWithShape="1">
+          <a:blip r:embed="rId2"/>
+          <a:srcRect l="23438" t="57361" r="50000" b="34583"/>
+          <a:stretch/>
+        </p:blipFill>
+        <p:spPr>
+          <a:xfrm>
+            <a:off x="5860231" y="5175682"/>
+            <a:ext cx="5684069" cy="969637"/>
+          </a:xfrm>
+          <a:prstGeom prst="rect">
+            <a:avLst/>
+          </a:prstGeom>
+        </p:spPr>
+      </p:pic>
+      <p:sp>
+        <p:nvSpPr>
+          <p:cNvPr id="10" name="TextBox 9">
+            <a:extLst>
+              <a:ext uri="{FF2B5EF4-FFF2-40B4-BE49-F238E27FC236}">
+                <a16:creationId xmlns:a16="http://schemas.microsoft.com/office/drawing/2014/main" id="{EF3B71F7-6D9A-4FD2-A4DB-7B780C96AB37}"/>
+              </a:ext>
+            </a:extLst>
+          </p:cNvPr>
+          <p:cNvSpPr txBox="1"/>
+          <p:nvPr/>
+        </p:nvSpPr>
+        <p:spPr>
+          <a:xfrm>
+            <a:off x="4665215" y="4332380"/>
+            <a:ext cx="1660125" cy="369332"/>
+          </a:xfrm>
+          <a:prstGeom prst="rect">
+            <a:avLst/>
+          </a:prstGeom>
+          <a:noFill/>
+        </p:spPr>
+        <p:txBody>
+          <a:bodyPr wrap="square" rtlCol="0">
+            <a:spAutoFit/>
+          </a:bodyPr>
+          <a:lstStyle/>
+          <a:p>
+            <a:r>
+              <a:rPr lang="en-US" dirty="0"/>
+              <a:t>Simple</a:t>
+            </a:r>
+          </a:p>
+        </p:txBody>
+      </p:sp>
+      <p:cxnSp>
+        <p:nvCxnSpPr>
+          <p:cNvPr id="12" name="Straight Arrow Connector 11">
+            <a:extLst>
+              <a:ext uri="{FF2B5EF4-FFF2-40B4-BE49-F238E27FC236}">
+                <a16:creationId xmlns:a16="http://schemas.microsoft.com/office/drawing/2014/main" id="{8E7D27CA-B524-4ACC-B9CA-3DADB7CD446E}"/>
+              </a:ext>
+            </a:extLst>
+          </p:cNvPr>
+          <p:cNvCxnSpPr/>
+          <p:nvPr/>
+        </p:nvCxnSpPr>
+        <p:spPr>
+          <a:xfrm flipH="1">
+            <a:off x="3648722" y="4518734"/>
+            <a:ext cx="949911" cy="0"/>
+          </a:xfrm>
+          <a:prstGeom prst="straightConnector1">
+            <a:avLst/>
+          </a:prstGeom>
+          <a:ln>
+            <a:tailEnd type="triangle"/>
+          </a:ln>
+        </p:spPr>
+        <p:style>
+          <a:lnRef idx="1">
+            <a:schemeClr val="accent1"/>
+          </a:lnRef>
+          <a:fillRef idx="0">
+            <a:schemeClr val="accent1"/>
+          </a:fillRef>
+          <a:effectRef idx="0">
+            <a:schemeClr val="accent1"/>
+          </a:effectRef>
+          <a:fontRef idx="minor">
+            <a:schemeClr val="tx1"/>
+          </a:fontRef>
+        </p:style>
+      </p:cxnSp>
+      <p:sp>
+        <p:nvSpPr>
+          <p:cNvPr id="13" name="TextBox 12">
+            <a:extLst>
+              <a:ext uri="{FF2B5EF4-FFF2-40B4-BE49-F238E27FC236}">
+                <a16:creationId xmlns:a16="http://schemas.microsoft.com/office/drawing/2014/main" id="{0BD025AE-3BF9-4E10-B395-7DF032703596}"/>
+              </a:ext>
+            </a:extLst>
+          </p:cNvPr>
+          <p:cNvSpPr txBox="1"/>
+          <p:nvPr/>
+        </p:nvSpPr>
+        <p:spPr>
+          <a:xfrm>
+            <a:off x="8076389" y="4332380"/>
+            <a:ext cx="1660125" cy="369332"/>
+          </a:xfrm>
+          <a:prstGeom prst="rect">
+            <a:avLst/>
+          </a:prstGeom>
+          <a:noFill/>
+        </p:spPr>
+        <p:txBody>
+          <a:bodyPr wrap="square" rtlCol="0">
+            <a:spAutoFit/>
+          </a:bodyPr>
+          <a:lstStyle/>
+          <a:p>
+            <a:r>
+              <a:rPr lang="en-US" dirty="0"/>
+              <a:t>Advanced</a:t>
+            </a:r>
+          </a:p>
+        </p:txBody>
+      </p:sp>
+      <p:cxnSp>
+        <p:nvCxnSpPr>
+          <p:cNvPr id="14" name="Straight Arrow Connector 13">
+            <a:extLst>
+              <a:ext uri="{FF2B5EF4-FFF2-40B4-BE49-F238E27FC236}">
+                <a16:creationId xmlns:a16="http://schemas.microsoft.com/office/drawing/2014/main" id="{FC72A1D4-A4AF-4BA5-AF17-A5BCA914B7FF}"/>
+              </a:ext>
+            </a:extLst>
+          </p:cNvPr>
+          <p:cNvCxnSpPr>
+            <a:cxnSpLocks/>
+            <a:endCxn id="7" idx="0"/>
+          </p:cNvCxnSpPr>
+          <p:nvPr/>
+        </p:nvCxnSpPr>
+        <p:spPr>
+          <a:xfrm>
+            <a:off x="8702266" y="4701712"/>
+            <a:ext cx="0" cy="473970"/>
+          </a:xfrm>
+          <a:prstGeom prst="straightConnector1">
+            <a:avLst/>
+          </a:prstGeom>
+          <a:ln>
+            <a:tailEnd type="triangle"/>
+          </a:ln>
+        </p:spPr>
+        <p:style>
+          <a:lnRef idx="1">
+            <a:schemeClr val="accent1"/>
+          </a:lnRef>
+          <a:fillRef idx="0">
+            <a:schemeClr val="accent1"/>
+          </a:fillRef>
+          <a:effectRef idx="0">
+            <a:schemeClr val="accent1"/>
+          </a:effectRef>
+          <a:fontRef idx="minor">
+            <a:schemeClr val="tx1"/>
+          </a:fontRef>
+        </p:style>
+      </p:cxnSp>
     </p:spTree>
     <p:extLst>
       <p:ext uri="{BB962C8B-B14F-4D97-AF65-F5344CB8AC3E}">
         <p14:creationId xmlns:p14="http://schemas.microsoft.com/office/powerpoint/2010/main" val="2763174191"/>
+      </p:ext>
+    </p:extLst>
+  </p:cSld>
+  <p:clrMapOvr>
+    <a:masterClrMapping/>
+  </p:clrMapOvr>
+</p:sld>
+</file>
+
+<file path=ppt/slides/slide7.xml><?xml version="1.0" encoding="utf-8"?>
+<p:sld xmlns:a="http://schemas.openxmlformats.org/drawingml/2006/main" xmlns:r="http://schemas.openxmlformats.org/officeDocument/2006/relationships" xmlns:p="http://schemas.openxmlformats.org/presentationml/2006/main">
+  <p:cSld>
+    <p:spTree>
+      <p:nvGrpSpPr>
+        <p:cNvPr id="1" name=""/>
+        <p:cNvGrpSpPr/>
+        <p:nvPr/>
+      </p:nvGrpSpPr>
+      <p:grpSpPr>
+        <a:xfrm>
+          <a:off x="0" y="0"/>
+          <a:ext cx="0" cy="0"/>
+          <a:chOff x="0" y="0"/>
+          <a:chExt cx="0" cy="0"/>
+        </a:xfrm>
+      </p:grpSpPr>
+      <p:sp>
+        <p:nvSpPr>
+          <p:cNvPr id="2" name="Title 1">
+            <a:extLst>
+              <a:ext uri="{FF2B5EF4-FFF2-40B4-BE49-F238E27FC236}">
+                <a16:creationId xmlns:a16="http://schemas.microsoft.com/office/drawing/2014/main" id="{091D69AC-2A36-4D91-B9DF-89140504316F}"/>
+              </a:ext>
+            </a:extLst>
+          </p:cNvPr>
+          <p:cNvSpPr>
+            <a:spLocks noGrp="1"/>
+          </p:cNvSpPr>
+          <p:nvPr>
+            <p:ph type="title"/>
+          </p:nvPr>
+        </p:nvSpPr>
+        <p:spPr>
+          <a:xfrm>
+            <a:off x="1097280" y="0"/>
+            <a:ext cx="10058400" cy="772357"/>
+          </a:xfrm>
+        </p:spPr>
+        <p:txBody>
+          <a:bodyPr/>
+          <a:lstStyle/>
+          <a:p>
+            <a:r>
+              <a:rPr lang="en-US" dirty="0"/>
+              <a:t>Modeling Difficulty	</a:t>
+            </a:r>
+          </a:p>
+        </p:txBody>
+      </p:sp>
+      <p:sp>
+        <p:nvSpPr>
+          <p:cNvPr id="3" name="Content Placeholder 2">
+            <a:extLst>
+              <a:ext uri="{FF2B5EF4-FFF2-40B4-BE49-F238E27FC236}">
+                <a16:creationId xmlns:a16="http://schemas.microsoft.com/office/drawing/2014/main" id="{9AB2A4B9-2C68-45ED-9EA0-A1A645594C7F}"/>
+              </a:ext>
+            </a:extLst>
+          </p:cNvPr>
+          <p:cNvSpPr>
+            <a:spLocks noGrp="1"/>
+          </p:cNvSpPr>
+          <p:nvPr>
+            <p:ph idx="1"/>
+          </p:nvPr>
+        </p:nvSpPr>
+        <p:spPr>
+          <a:xfrm>
+            <a:off x="1097280" y="1269505"/>
+            <a:ext cx="10372670" cy="3969273"/>
+          </a:xfrm>
+        </p:spPr>
+        <p:txBody>
+          <a:bodyPr>
+            <a:normAutofit/>
+          </a:bodyPr>
+          <a:lstStyle/>
+          <a:p>
+            <a:pPr>
+              <a:buFont typeface="Arial" panose="020B0604020202020204" pitchFamily="34" charset="0"/>
+              <a:buChar char="•"/>
+            </a:pPr>
+            <a:r>
+              <a:rPr lang="en-US" sz="2800" dirty="0"/>
+              <a:t>Conceptual modeling and code outlining</a:t>
+            </a:r>
+          </a:p>
+          <a:p>
+            <a:pPr>
+              <a:buFont typeface="Arial" panose="020B0604020202020204" pitchFamily="34" charset="0"/>
+              <a:buChar char="•"/>
+            </a:pPr>
+            <a:endParaRPr lang="en-US" dirty="0"/>
+          </a:p>
+          <a:p>
+            <a:pPr>
+              <a:buFont typeface="Arial" panose="020B0604020202020204" pitchFamily="34" charset="0"/>
+              <a:buChar char="•"/>
+            </a:pPr>
+            <a:endParaRPr lang="en-US" dirty="0"/>
+          </a:p>
+        </p:txBody>
+      </p:sp>
+      <p:pic>
+        <p:nvPicPr>
+          <p:cNvPr id="4" name="Picture 3">
+            <a:extLst>
+              <a:ext uri="{FF2B5EF4-FFF2-40B4-BE49-F238E27FC236}">
+                <a16:creationId xmlns:a16="http://schemas.microsoft.com/office/drawing/2014/main" id="{E3D871CA-EE96-409E-8CDA-99F83995BA54}"/>
+              </a:ext>
+            </a:extLst>
+          </p:cNvPr>
+          <p:cNvPicPr>
+            <a:picLocks noChangeAspect="1"/>
+          </p:cNvPicPr>
+          <p:nvPr/>
+        </p:nvPicPr>
+        <p:blipFill>
+          <a:blip r:embed="rId2"/>
+          <a:stretch>
+            <a:fillRect/>
+          </a:stretch>
+        </p:blipFill>
+        <p:spPr>
+          <a:xfrm>
+            <a:off x="2226043" y="1867068"/>
+            <a:ext cx="7367947" cy="4134237"/>
+          </a:xfrm>
+          <a:prstGeom prst="rect">
+            <a:avLst/>
+          </a:prstGeom>
+        </p:spPr>
+      </p:pic>
+    </p:spTree>
+    <p:extLst>
+      <p:ext uri="{BB962C8B-B14F-4D97-AF65-F5344CB8AC3E}">
+        <p14:creationId xmlns:p14="http://schemas.microsoft.com/office/powerpoint/2010/main" val="4243080807"/>
+      </p:ext>
+    </p:extLst>
+  </p:cSld>
+  <p:clrMapOvr>
+    <a:masterClrMapping/>
+  </p:clrMapOvr>
+</p:sld>
+</file>
+
+<file path=ppt/slides/slide8.xml><?xml version="1.0" encoding="utf-8"?>
+<p:sld xmlns:a="http://schemas.openxmlformats.org/drawingml/2006/main" xmlns:r="http://schemas.openxmlformats.org/officeDocument/2006/relationships" xmlns:p="http://schemas.openxmlformats.org/presentationml/2006/main">
+  <p:cSld>
+    <p:spTree>
+      <p:nvGrpSpPr>
+        <p:cNvPr id="1" name=""/>
+        <p:cNvGrpSpPr/>
+        <p:nvPr/>
+      </p:nvGrpSpPr>
+      <p:grpSpPr>
+        <a:xfrm>
+          <a:off x="0" y="0"/>
+          <a:ext cx="0" cy="0"/>
+          <a:chOff x="0" y="0"/>
+          <a:chExt cx="0" cy="0"/>
+        </a:xfrm>
+      </p:grpSpPr>
+      <p:sp>
+        <p:nvSpPr>
+          <p:cNvPr id="2" name="Title 1">
+            <a:extLst>
+              <a:ext uri="{FF2B5EF4-FFF2-40B4-BE49-F238E27FC236}">
+                <a16:creationId xmlns:a16="http://schemas.microsoft.com/office/drawing/2014/main" id="{091D69AC-2A36-4D91-B9DF-89140504316F}"/>
+              </a:ext>
+            </a:extLst>
+          </p:cNvPr>
+          <p:cNvSpPr>
+            <a:spLocks noGrp="1"/>
+          </p:cNvSpPr>
+          <p:nvPr>
+            <p:ph type="title"/>
+          </p:nvPr>
+        </p:nvSpPr>
+        <p:spPr>
+          <a:xfrm>
+            <a:off x="1097280" y="0"/>
+            <a:ext cx="10058400" cy="772357"/>
+          </a:xfrm>
+        </p:spPr>
+        <p:txBody>
+          <a:bodyPr/>
+          <a:lstStyle/>
+          <a:p>
+            <a:r>
+              <a:rPr lang="en-US" dirty="0"/>
+              <a:t>Modeling Difficulty	</a:t>
+            </a:r>
+          </a:p>
+        </p:txBody>
+      </p:sp>
+      <p:sp>
+        <p:nvSpPr>
+          <p:cNvPr id="3" name="Content Placeholder 2">
+            <a:extLst>
+              <a:ext uri="{FF2B5EF4-FFF2-40B4-BE49-F238E27FC236}">
+                <a16:creationId xmlns:a16="http://schemas.microsoft.com/office/drawing/2014/main" id="{9AB2A4B9-2C68-45ED-9EA0-A1A645594C7F}"/>
+              </a:ext>
+            </a:extLst>
+          </p:cNvPr>
+          <p:cNvSpPr>
+            <a:spLocks noGrp="1"/>
+          </p:cNvSpPr>
+          <p:nvPr>
+            <p:ph idx="1"/>
+          </p:nvPr>
+        </p:nvSpPr>
+        <p:spPr>
+          <a:xfrm>
+            <a:off x="1097280" y="1269505"/>
+            <a:ext cx="10372670" cy="3969273"/>
+          </a:xfrm>
+        </p:spPr>
+        <p:txBody>
+          <a:bodyPr>
+            <a:normAutofit/>
+          </a:bodyPr>
+          <a:lstStyle/>
+          <a:p>
+            <a:pPr>
+              <a:buFont typeface="Arial" panose="020B0604020202020204" pitchFamily="34" charset="0"/>
+              <a:buChar char="•"/>
+            </a:pPr>
+            <a:r>
+              <a:rPr lang="en-US" sz="2800" dirty="0"/>
+              <a:t>Conceptual modeling and code outlining</a:t>
+            </a:r>
+          </a:p>
+          <a:p>
+            <a:pPr>
+              <a:buFont typeface="Arial" panose="020B0604020202020204" pitchFamily="34" charset="0"/>
+              <a:buChar char="•"/>
+            </a:pPr>
+            <a:endParaRPr lang="en-US" dirty="0"/>
+          </a:p>
+          <a:p>
+            <a:pPr>
+              <a:buFont typeface="Arial" panose="020B0604020202020204" pitchFamily="34" charset="0"/>
+              <a:buChar char="•"/>
+            </a:pPr>
+            <a:endParaRPr lang="en-US" dirty="0"/>
+          </a:p>
+        </p:txBody>
+      </p:sp>
+      <p:pic>
+        <p:nvPicPr>
+          <p:cNvPr id="6" name="Picture 5">
+            <a:extLst>
+              <a:ext uri="{FF2B5EF4-FFF2-40B4-BE49-F238E27FC236}">
+                <a16:creationId xmlns:a16="http://schemas.microsoft.com/office/drawing/2014/main" id="{BF33C477-EFC3-40B5-BDD2-73FAFADF17E8}"/>
+              </a:ext>
+            </a:extLst>
+          </p:cNvPr>
+          <p:cNvPicPr>
+            <a:picLocks noChangeAspect="1"/>
+          </p:cNvPicPr>
+          <p:nvPr/>
+        </p:nvPicPr>
+        <p:blipFill rotWithShape="1">
+          <a:blip r:embed="rId2"/>
+          <a:srcRect l="4063" t="16805" r="36172" b="51806"/>
+          <a:stretch/>
+        </p:blipFill>
+        <p:spPr>
+          <a:xfrm>
+            <a:off x="2483167" y="2177815"/>
+            <a:ext cx="7286625" cy="2152651"/>
+          </a:xfrm>
+          <a:prstGeom prst="rect">
+            <a:avLst/>
+          </a:prstGeom>
+        </p:spPr>
+      </p:pic>
+    </p:spTree>
+    <p:extLst>
+      <p:ext uri="{BB962C8B-B14F-4D97-AF65-F5344CB8AC3E}">
+        <p14:creationId xmlns:p14="http://schemas.microsoft.com/office/powerpoint/2010/main" val="2505330130"/>
+      </p:ext>
+    </p:extLst>
+  </p:cSld>
+  <p:clrMapOvr>
+    <a:masterClrMapping/>
+  </p:clrMapOvr>
+</p:sld>
+</file>
+
+<file path=ppt/slides/slide9.xml><?xml version="1.0" encoding="utf-8"?>
+<p:sld xmlns:a="http://schemas.openxmlformats.org/drawingml/2006/main" xmlns:r="http://schemas.openxmlformats.org/officeDocument/2006/relationships" xmlns:p="http://schemas.openxmlformats.org/presentationml/2006/main">
+  <p:cSld>
+    <p:spTree>
+      <p:nvGrpSpPr>
+        <p:cNvPr id="1" name=""/>
+        <p:cNvGrpSpPr/>
+        <p:nvPr/>
+      </p:nvGrpSpPr>
+      <p:grpSpPr>
+        <a:xfrm>
+          <a:off x="0" y="0"/>
+          <a:ext cx="0" cy="0"/>
+          <a:chOff x="0" y="0"/>
+          <a:chExt cx="0" cy="0"/>
+        </a:xfrm>
+      </p:grpSpPr>
+      <p:sp>
+        <p:nvSpPr>
+          <p:cNvPr id="2" name="Title 1">
+            <a:extLst>
+              <a:ext uri="{FF2B5EF4-FFF2-40B4-BE49-F238E27FC236}">
+                <a16:creationId xmlns:a16="http://schemas.microsoft.com/office/drawing/2014/main" id="{091D69AC-2A36-4D91-B9DF-89140504316F}"/>
+              </a:ext>
+            </a:extLst>
+          </p:cNvPr>
+          <p:cNvSpPr>
+            <a:spLocks noGrp="1"/>
+          </p:cNvSpPr>
+          <p:nvPr>
+            <p:ph type="title"/>
+          </p:nvPr>
+        </p:nvSpPr>
+        <p:spPr>
+          <a:xfrm>
+            <a:off x="1097280" y="0"/>
+            <a:ext cx="10058400" cy="772357"/>
+          </a:xfrm>
+        </p:spPr>
+        <p:txBody>
+          <a:bodyPr/>
+          <a:lstStyle/>
+          <a:p>
+            <a:r>
+              <a:rPr lang="en-US" dirty="0"/>
+              <a:t>Modeling Difficulty	</a:t>
+            </a:r>
+          </a:p>
+        </p:txBody>
+      </p:sp>
+      <p:sp>
+        <p:nvSpPr>
+          <p:cNvPr id="3" name="Content Placeholder 2">
+            <a:extLst>
+              <a:ext uri="{FF2B5EF4-FFF2-40B4-BE49-F238E27FC236}">
+                <a16:creationId xmlns:a16="http://schemas.microsoft.com/office/drawing/2014/main" id="{9AB2A4B9-2C68-45ED-9EA0-A1A645594C7F}"/>
+              </a:ext>
+            </a:extLst>
+          </p:cNvPr>
+          <p:cNvSpPr>
+            <a:spLocks noGrp="1"/>
+          </p:cNvSpPr>
+          <p:nvPr>
+            <p:ph idx="1"/>
+          </p:nvPr>
+        </p:nvSpPr>
+        <p:spPr>
+          <a:xfrm>
+            <a:off x="1097280" y="1269505"/>
+            <a:ext cx="10372670" cy="3969273"/>
+          </a:xfrm>
+        </p:spPr>
+        <p:txBody>
+          <a:bodyPr>
+            <a:normAutofit/>
+          </a:bodyPr>
+          <a:lstStyle/>
+          <a:p>
+            <a:pPr>
+              <a:buFont typeface="Arial" panose="020B0604020202020204" pitchFamily="34" charset="0"/>
+              <a:buChar char="•"/>
+            </a:pPr>
+            <a:r>
+              <a:rPr lang="en-US" sz="2800" dirty="0"/>
+              <a:t>When in doubt, take a break</a:t>
+            </a:r>
+          </a:p>
+          <a:p>
+            <a:pPr>
+              <a:buFont typeface="Arial" panose="020B0604020202020204" pitchFamily="34" charset="0"/>
+              <a:buChar char="•"/>
+            </a:pPr>
+            <a:endParaRPr lang="en-US" sz="2800" dirty="0"/>
+          </a:p>
+          <a:p>
+            <a:pPr>
+              <a:buFont typeface="Arial" panose="020B0604020202020204" pitchFamily="34" charset="0"/>
+              <a:buChar char="•"/>
+            </a:pPr>
+            <a:r>
+              <a:rPr lang="en-US" sz="2800" dirty="0"/>
+              <a:t>Go for a walk</a:t>
+            </a:r>
+          </a:p>
+          <a:p>
+            <a:pPr>
+              <a:buFont typeface="Arial" panose="020B0604020202020204" pitchFamily="34" charset="0"/>
+              <a:buChar char="•"/>
+            </a:pPr>
+            <a:r>
+              <a:rPr lang="en-US" sz="2800" dirty="0"/>
+              <a:t>Get a snack</a:t>
+            </a:r>
+          </a:p>
+          <a:p>
+            <a:pPr>
+              <a:buFont typeface="Arial" panose="020B0604020202020204" pitchFamily="34" charset="0"/>
+              <a:buChar char="•"/>
+            </a:pPr>
+            <a:r>
+              <a:rPr lang="en-US" sz="2800" dirty="0"/>
+              <a:t>Move to another task</a:t>
+            </a:r>
+          </a:p>
+          <a:p>
+            <a:pPr marL="0" indent="0">
+              <a:buNone/>
+            </a:pPr>
+            <a:endParaRPr lang="en-US" dirty="0"/>
+          </a:p>
+          <a:p>
+            <a:pPr>
+              <a:buFont typeface="Arial" panose="020B0604020202020204" pitchFamily="34" charset="0"/>
+              <a:buChar char="•"/>
+            </a:pPr>
+            <a:endParaRPr lang="en-US" dirty="0"/>
+          </a:p>
+        </p:txBody>
+      </p:sp>
+      <p:pic>
+        <p:nvPicPr>
+          <p:cNvPr id="4" name="Picture 3">
+            <a:extLst>
+              <a:ext uri="{FF2B5EF4-FFF2-40B4-BE49-F238E27FC236}">
+                <a16:creationId xmlns:a16="http://schemas.microsoft.com/office/drawing/2014/main" id="{14D09684-9A6B-4646-AD0B-789F9B847C7B}"/>
+              </a:ext>
+            </a:extLst>
+          </p:cNvPr>
+          <p:cNvPicPr>
+            <a:picLocks noChangeAspect="1"/>
+          </p:cNvPicPr>
+          <p:nvPr/>
+        </p:nvPicPr>
+        <p:blipFill>
+          <a:blip r:embed="rId2"/>
+          <a:stretch>
+            <a:fillRect/>
+          </a:stretch>
+        </p:blipFill>
+        <p:spPr>
+          <a:xfrm>
+            <a:off x="7432921" y="2225104"/>
+            <a:ext cx="4450025" cy="3363391"/>
+          </a:xfrm>
+          <a:prstGeom prst="rect">
+            <a:avLst/>
+          </a:prstGeom>
+        </p:spPr>
+      </p:pic>
+    </p:spTree>
+    <p:extLst>
+      <p:ext uri="{BB962C8B-B14F-4D97-AF65-F5344CB8AC3E}">
+        <p14:creationId xmlns:p14="http://schemas.microsoft.com/office/powerpoint/2010/main" val="366315062"/>
       </p:ext>
     </p:extLst>
   </p:cSld>

</xml_diff>